<commit_message>
Changed the logic of power permit (new PLC program). Updated opi and the documentation.
</commit_message>
<xml_diff>
--- a/doc/Logic_v2.pptx
+++ b/doc/Logic_v2.pptx
@@ -4,6 +4,9 @@
   <p:sldMasterIdLst>
     <p:sldMasterId id="2147483648" r:id="rId1"/>
   </p:sldMasterIdLst>
+  <p:notesMasterIdLst>
+    <p:notesMasterId r:id="rId6"/>
+  </p:notesMasterIdLst>
   <p:sldIdLst>
     <p:sldId id="256" r:id="rId2"/>
     <p:sldId id="257" r:id="rId3"/>
@@ -115,6 +118,356 @@
 </p:presentation>
 </file>
 
+<file path=ppt/notesMasters/notesMaster1.xml><?xml version="1.0" encoding="utf-8"?>
+<p:notesMaster xmlns:a="http://schemas.openxmlformats.org/drawingml/2006/main" xmlns:r="http://schemas.openxmlformats.org/officeDocument/2006/relationships" xmlns:p="http://schemas.openxmlformats.org/presentationml/2006/main">
+  <p:cSld>
+    <p:bg>
+      <p:bgRef idx="1001">
+        <a:schemeClr val="bg1"/>
+      </p:bgRef>
+    </p:bg>
+    <p:spTree>
+      <p:nvGrpSpPr>
+        <p:cNvPr id="1" name=""/>
+        <p:cNvGrpSpPr/>
+        <p:nvPr/>
+      </p:nvGrpSpPr>
+      <p:grpSpPr>
+        <a:xfrm>
+          <a:off x="0" y="0"/>
+          <a:ext cx="0" cy="0"/>
+          <a:chOff x="0" y="0"/>
+          <a:chExt cx="0" cy="0"/>
+        </a:xfrm>
+      </p:grpSpPr>
+      <p:sp>
+        <p:nvSpPr>
+          <p:cNvPr id="2" name="Header Placeholder 1"/>
+          <p:cNvSpPr>
+            <a:spLocks noGrp="1"/>
+          </p:cNvSpPr>
+          <p:nvPr>
+            <p:ph type="hdr" sz="quarter"/>
+          </p:nvPr>
+        </p:nvSpPr>
+        <p:spPr>
+          <a:xfrm>
+            <a:off x="0" y="0"/>
+            <a:ext cx="2971800" cy="458788"/>
+          </a:xfrm>
+          <a:prstGeom prst="rect">
+            <a:avLst/>
+          </a:prstGeom>
+        </p:spPr>
+        <p:txBody>
+          <a:bodyPr vert="horz" lIns="91440" tIns="45720" rIns="91440" bIns="45720" rtlCol="0"/>
+          <a:lstStyle>
+            <a:lvl1pPr algn="l">
+              <a:defRPr sz="1200"/>
+            </a:lvl1pPr>
+          </a:lstStyle>
+          <a:p>
+            <a:endParaRPr lang="sv-SE"/>
+          </a:p>
+        </p:txBody>
+      </p:sp>
+      <p:sp>
+        <p:nvSpPr>
+          <p:cNvPr id="3" name="Date Placeholder 2"/>
+          <p:cNvSpPr>
+            <a:spLocks noGrp="1"/>
+          </p:cNvSpPr>
+          <p:nvPr>
+            <p:ph type="dt" idx="1"/>
+          </p:nvPr>
+        </p:nvSpPr>
+        <p:spPr>
+          <a:xfrm>
+            <a:off x="3884613" y="0"/>
+            <a:ext cx="2971800" cy="458788"/>
+          </a:xfrm>
+          <a:prstGeom prst="rect">
+            <a:avLst/>
+          </a:prstGeom>
+        </p:spPr>
+        <p:txBody>
+          <a:bodyPr vert="horz" lIns="91440" tIns="45720" rIns="91440" bIns="45720" rtlCol="0"/>
+          <a:lstStyle>
+            <a:lvl1pPr algn="r">
+              <a:defRPr sz="1200"/>
+            </a:lvl1pPr>
+          </a:lstStyle>
+          <a:p>
+            <a:fld id="{2AD46016-8A63-4383-BAF1-E352D74E616E}" type="datetimeFigureOut">
+              <a:rPr lang="sv-SE" smtClean="0"/>
+              <a:t>2021-02-11</a:t>
+            </a:fld>
+            <a:endParaRPr lang="sv-SE"/>
+          </a:p>
+        </p:txBody>
+      </p:sp>
+      <p:sp>
+        <p:nvSpPr>
+          <p:cNvPr id="4" name="Slide Image Placeholder 3"/>
+          <p:cNvSpPr>
+            <a:spLocks noGrp="1" noRot="1" noChangeAspect="1"/>
+          </p:cNvSpPr>
+          <p:nvPr>
+            <p:ph type="sldImg" idx="2"/>
+          </p:nvPr>
+        </p:nvSpPr>
+        <p:spPr>
+          <a:xfrm>
+            <a:off x="685800" y="1143000"/>
+            <a:ext cx="5486400" cy="3086100"/>
+          </a:xfrm>
+          <a:prstGeom prst="rect">
+            <a:avLst/>
+          </a:prstGeom>
+          <a:noFill/>
+          <a:ln w="12700">
+            <a:solidFill>
+              <a:prstClr val="black"/>
+            </a:solidFill>
+          </a:ln>
+        </p:spPr>
+        <p:txBody>
+          <a:bodyPr vert="horz" lIns="91440" tIns="45720" rIns="91440" bIns="45720" rtlCol="0" anchor="ctr"/>
+          <a:lstStyle/>
+          <a:p>
+            <a:endParaRPr lang="sv-SE"/>
+          </a:p>
+        </p:txBody>
+      </p:sp>
+      <p:sp>
+        <p:nvSpPr>
+          <p:cNvPr id="5" name="Notes Placeholder 4"/>
+          <p:cNvSpPr>
+            <a:spLocks noGrp="1"/>
+          </p:cNvSpPr>
+          <p:nvPr>
+            <p:ph type="body" sz="quarter" idx="3"/>
+          </p:nvPr>
+        </p:nvSpPr>
+        <p:spPr>
+          <a:xfrm>
+            <a:off x="685800" y="4400550"/>
+            <a:ext cx="5486400" cy="3600450"/>
+          </a:xfrm>
+          <a:prstGeom prst="rect">
+            <a:avLst/>
+          </a:prstGeom>
+        </p:spPr>
+        <p:txBody>
+          <a:bodyPr vert="horz" lIns="91440" tIns="45720" rIns="91440" bIns="45720" rtlCol="0"/>
+          <a:lstStyle/>
+          <a:p>
+            <a:pPr lvl="0"/>
+            <a:r>
+              <a:rPr lang="en-US" smtClean="0"/>
+              <a:t>Edit Master text styles</a:t>
+            </a:r>
+          </a:p>
+          <a:p>
+            <a:pPr lvl="1"/>
+            <a:r>
+              <a:rPr lang="en-US" smtClean="0"/>
+              <a:t>Second level</a:t>
+            </a:r>
+          </a:p>
+          <a:p>
+            <a:pPr lvl="2"/>
+            <a:r>
+              <a:rPr lang="en-US" smtClean="0"/>
+              <a:t>Third level</a:t>
+            </a:r>
+          </a:p>
+          <a:p>
+            <a:pPr lvl="3"/>
+            <a:r>
+              <a:rPr lang="en-US" smtClean="0"/>
+              <a:t>Fourth level</a:t>
+            </a:r>
+          </a:p>
+          <a:p>
+            <a:pPr lvl="4"/>
+            <a:r>
+              <a:rPr lang="en-US" smtClean="0"/>
+              <a:t>Fifth level</a:t>
+            </a:r>
+            <a:endParaRPr lang="sv-SE"/>
+          </a:p>
+        </p:txBody>
+      </p:sp>
+      <p:sp>
+        <p:nvSpPr>
+          <p:cNvPr id="6" name="Footer Placeholder 5"/>
+          <p:cNvSpPr>
+            <a:spLocks noGrp="1"/>
+          </p:cNvSpPr>
+          <p:nvPr>
+            <p:ph type="ftr" sz="quarter" idx="4"/>
+          </p:nvPr>
+        </p:nvSpPr>
+        <p:spPr>
+          <a:xfrm>
+            <a:off x="0" y="8685213"/>
+            <a:ext cx="2971800" cy="458787"/>
+          </a:xfrm>
+          <a:prstGeom prst="rect">
+            <a:avLst/>
+          </a:prstGeom>
+        </p:spPr>
+        <p:txBody>
+          <a:bodyPr vert="horz" lIns="91440" tIns="45720" rIns="91440" bIns="45720" rtlCol="0" anchor="b"/>
+          <a:lstStyle>
+            <a:lvl1pPr algn="l">
+              <a:defRPr sz="1200"/>
+            </a:lvl1pPr>
+          </a:lstStyle>
+          <a:p>
+            <a:endParaRPr lang="sv-SE"/>
+          </a:p>
+        </p:txBody>
+      </p:sp>
+      <p:sp>
+        <p:nvSpPr>
+          <p:cNvPr id="7" name="Slide Number Placeholder 6"/>
+          <p:cNvSpPr>
+            <a:spLocks noGrp="1"/>
+          </p:cNvSpPr>
+          <p:nvPr>
+            <p:ph type="sldNum" sz="quarter" idx="5"/>
+          </p:nvPr>
+        </p:nvSpPr>
+        <p:spPr>
+          <a:xfrm>
+            <a:off x="3884613" y="8685213"/>
+            <a:ext cx="2971800" cy="458787"/>
+          </a:xfrm>
+          <a:prstGeom prst="rect">
+            <a:avLst/>
+          </a:prstGeom>
+        </p:spPr>
+        <p:txBody>
+          <a:bodyPr vert="horz" lIns="91440" tIns="45720" rIns="91440" bIns="45720" rtlCol="0" anchor="b"/>
+          <a:lstStyle>
+            <a:lvl1pPr algn="r">
+              <a:defRPr sz="1200"/>
+            </a:lvl1pPr>
+          </a:lstStyle>
+          <a:p>
+            <a:fld id="{94D7B219-092C-48FF-ABD7-FDC1CC5C4FC3}" type="slidenum">
+              <a:rPr lang="sv-SE" smtClean="0"/>
+              <a:t>‹#›</a:t>
+            </a:fld>
+            <a:endParaRPr lang="sv-SE"/>
+          </a:p>
+        </p:txBody>
+      </p:sp>
+    </p:spTree>
+    <p:extLst>
+      <p:ext uri="{BB962C8B-B14F-4D97-AF65-F5344CB8AC3E}">
+        <p14:creationId xmlns:p14="http://schemas.microsoft.com/office/powerpoint/2010/main" val="240469515"/>
+      </p:ext>
+    </p:extLst>
+  </p:cSld>
+  <p:clrMap bg1="lt1" tx1="dk1" bg2="lt2" tx2="dk2" accent1="accent1" accent2="accent2" accent3="accent3" accent4="accent4" accent5="accent5" accent6="accent6" hlink="hlink" folHlink="folHlink"/>
+  <p:notesStyle>
+    <a:lvl1pPr marL="0" algn="l" defTabSz="914400" rtl="0" eaLnBrk="1" latinLnBrk="0" hangingPunct="1">
+      <a:defRPr sz="1200" kern="1200">
+        <a:solidFill>
+          <a:schemeClr val="tx1"/>
+        </a:solidFill>
+        <a:latin typeface="+mn-lt"/>
+        <a:ea typeface="+mn-ea"/>
+        <a:cs typeface="+mn-cs"/>
+      </a:defRPr>
+    </a:lvl1pPr>
+    <a:lvl2pPr marL="457200" algn="l" defTabSz="914400" rtl="0" eaLnBrk="1" latinLnBrk="0" hangingPunct="1">
+      <a:defRPr sz="1200" kern="1200">
+        <a:solidFill>
+          <a:schemeClr val="tx1"/>
+        </a:solidFill>
+        <a:latin typeface="+mn-lt"/>
+        <a:ea typeface="+mn-ea"/>
+        <a:cs typeface="+mn-cs"/>
+      </a:defRPr>
+    </a:lvl2pPr>
+    <a:lvl3pPr marL="914400" algn="l" defTabSz="914400" rtl="0" eaLnBrk="1" latinLnBrk="0" hangingPunct="1">
+      <a:defRPr sz="1200" kern="1200">
+        <a:solidFill>
+          <a:schemeClr val="tx1"/>
+        </a:solidFill>
+        <a:latin typeface="+mn-lt"/>
+        <a:ea typeface="+mn-ea"/>
+        <a:cs typeface="+mn-cs"/>
+      </a:defRPr>
+    </a:lvl3pPr>
+    <a:lvl4pPr marL="1371600" algn="l" defTabSz="914400" rtl="0" eaLnBrk="1" latinLnBrk="0" hangingPunct="1">
+      <a:defRPr sz="1200" kern="1200">
+        <a:solidFill>
+          <a:schemeClr val="tx1"/>
+        </a:solidFill>
+        <a:latin typeface="+mn-lt"/>
+        <a:ea typeface="+mn-ea"/>
+        <a:cs typeface="+mn-cs"/>
+      </a:defRPr>
+    </a:lvl4pPr>
+    <a:lvl5pPr marL="1828800" algn="l" defTabSz="914400" rtl="0" eaLnBrk="1" latinLnBrk="0" hangingPunct="1">
+      <a:defRPr sz="1200" kern="1200">
+        <a:solidFill>
+          <a:schemeClr val="tx1"/>
+        </a:solidFill>
+        <a:latin typeface="+mn-lt"/>
+        <a:ea typeface="+mn-ea"/>
+        <a:cs typeface="+mn-cs"/>
+      </a:defRPr>
+    </a:lvl5pPr>
+    <a:lvl6pPr marL="2286000" algn="l" defTabSz="914400" rtl="0" eaLnBrk="1" latinLnBrk="0" hangingPunct="1">
+      <a:defRPr sz="1200" kern="1200">
+        <a:solidFill>
+          <a:schemeClr val="tx1"/>
+        </a:solidFill>
+        <a:latin typeface="+mn-lt"/>
+        <a:ea typeface="+mn-ea"/>
+        <a:cs typeface="+mn-cs"/>
+      </a:defRPr>
+    </a:lvl6pPr>
+    <a:lvl7pPr marL="2743200" algn="l" defTabSz="914400" rtl="0" eaLnBrk="1" latinLnBrk="0" hangingPunct="1">
+      <a:defRPr sz="1200" kern="1200">
+        <a:solidFill>
+          <a:schemeClr val="tx1"/>
+        </a:solidFill>
+        <a:latin typeface="+mn-lt"/>
+        <a:ea typeface="+mn-ea"/>
+        <a:cs typeface="+mn-cs"/>
+      </a:defRPr>
+    </a:lvl7pPr>
+    <a:lvl8pPr marL="3200400" algn="l" defTabSz="914400" rtl="0" eaLnBrk="1" latinLnBrk="0" hangingPunct="1">
+      <a:defRPr sz="1200" kern="1200">
+        <a:solidFill>
+          <a:schemeClr val="tx1"/>
+        </a:solidFill>
+        <a:latin typeface="+mn-lt"/>
+        <a:ea typeface="+mn-ea"/>
+        <a:cs typeface="+mn-cs"/>
+      </a:defRPr>
+    </a:lvl8pPr>
+    <a:lvl9pPr marL="3657600" algn="l" defTabSz="914400" rtl="0" eaLnBrk="1" latinLnBrk="0" hangingPunct="1">
+      <a:defRPr sz="1200" kern="1200">
+        <a:solidFill>
+          <a:schemeClr val="tx1"/>
+        </a:solidFill>
+        <a:latin typeface="+mn-lt"/>
+        <a:ea typeface="+mn-ea"/>
+        <a:cs typeface="+mn-cs"/>
+      </a:defRPr>
+    </a:lvl9pPr>
+  </p:notesStyle>
+</p:notesMaster>
+</file>
+
 <file path=ppt/slideLayouts/slideLayout1.xml><?xml version="1.0" encoding="utf-8"?>
 <p:sldLayout xmlns:a="http://schemas.openxmlformats.org/drawingml/2006/main" xmlns:r="http://schemas.openxmlformats.org/officeDocument/2006/relationships" xmlns:p="http://schemas.openxmlformats.org/presentationml/2006/main" type="title" preserve="1">
   <p:cSld name="Title Slide">
@@ -260,10 +613,10 @@
           <a:bodyPr/>
           <a:lstStyle/>
           <a:p>
-            <a:fld id="{8C16488A-8360-4894-8DFF-01D12F7C9940}" type="datetimeFigureOut">
+            <a:r>
               <a:rPr lang="en-US" smtClean="0"/>
-              <a:t>27-Nov-20</a:t>
-            </a:fld>
+              <a:t>2021-02-11</a:t>
+            </a:r>
             <a:endParaRPr lang="en-US"/>
           </a:p>
         </p:txBody>
@@ -458,10 +811,10 @@
           <a:bodyPr/>
           <a:lstStyle/>
           <a:p>
-            <a:fld id="{8C16488A-8360-4894-8DFF-01D12F7C9940}" type="datetimeFigureOut">
+            <a:r>
               <a:rPr lang="en-US" smtClean="0"/>
-              <a:t>27-Nov-20</a:t>
-            </a:fld>
+              <a:t>2021-02-11</a:t>
+            </a:r>
             <a:endParaRPr lang="en-US"/>
           </a:p>
         </p:txBody>
@@ -666,10 +1019,10 @@
           <a:bodyPr/>
           <a:lstStyle/>
           <a:p>
-            <a:fld id="{8C16488A-8360-4894-8DFF-01D12F7C9940}" type="datetimeFigureOut">
+            <a:r>
               <a:rPr lang="en-US" smtClean="0"/>
-              <a:t>27-Nov-20</a:t>
-            </a:fld>
+              <a:t>2021-02-11</a:t>
+            </a:r>
             <a:endParaRPr lang="en-US"/>
           </a:p>
         </p:txBody>
@@ -864,10 +1217,10 @@
           <a:bodyPr/>
           <a:lstStyle/>
           <a:p>
-            <a:fld id="{8C16488A-8360-4894-8DFF-01D12F7C9940}" type="datetimeFigureOut">
+            <a:r>
               <a:rPr lang="en-US" smtClean="0"/>
-              <a:t>27-Nov-20</a:t>
-            </a:fld>
+              <a:t>2021-02-11</a:t>
+            </a:r>
             <a:endParaRPr lang="en-US"/>
           </a:p>
         </p:txBody>
@@ -1139,10 +1492,10 @@
           <a:bodyPr/>
           <a:lstStyle/>
           <a:p>
-            <a:fld id="{8C16488A-8360-4894-8DFF-01D12F7C9940}" type="datetimeFigureOut">
+            <a:r>
               <a:rPr lang="en-US" smtClean="0"/>
-              <a:t>27-Nov-20</a:t>
-            </a:fld>
+              <a:t>2021-02-11</a:t>
+            </a:r>
             <a:endParaRPr lang="en-US"/>
           </a:p>
         </p:txBody>
@@ -1404,10 +1757,10 @@
           <a:bodyPr/>
           <a:lstStyle/>
           <a:p>
-            <a:fld id="{8C16488A-8360-4894-8DFF-01D12F7C9940}" type="datetimeFigureOut">
+            <a:r>
               <a:rPr lang="en-US" smtClean="0"/>
-              <a:t>27-Nov-20</a:t>
-            </a:fld>
+              <a:t>2021-02-11</a:t>
+            </a:r>
             <a:endParaRPr lang="en-US"/>
           </a:p>
         </p:txBody>
@@ -1816,10 +2169,10 @@
           <a:bodyPr/>
           <a:lstStyle/>
           <a:p>
-            <a:fld id="{8C16488A-8360-4894-8DFF-01D12F7C9940}" type="datetimeFigureOut">
+            <a:r>
               <a:rPr lang="en-US" smtClean="0"/>
-              <a:t>27-Nov-20</a:t>
-            </a:fld>
+              <a:t>2021-02-11</a:t>
+            </a:r>
             <a:endParaRPr lang="en-US"/>
           </a:p>
         </p:txBody>
@@ -1957,10 +2310,10 @@
           <a:bodyPr/>
           <a:lstStyle/>
           <a:p>
-            <a:fld id="{8C16488A-8360-4894-8DFF-01D12F7C9940}" type="datetimeFigureOut">
+            <a:r>
               <a:rPr lang="en-US" smtClean="0"/>
-              <a:t>27-Nov-20</a:t>
-            </a:fld>
+              <a:t>2021-02-11</a:t>
+            </a:r>
             <a:endParaRPr lang="en-US"/>
           </a:p>
         </p:txBody>
@@ -2070,10 +2423,10 @@
           <a:bodyPr/>
           <a:lstStyle/>
           <a:p>
-            <a:fld id="{8C16488A-8360-4894-8DFF-01D12F7C9940}" type="datetimeFigureOut">
+            <a:r>
               <a:rPr lang="en-US" smtClean="0"/>
-              <a:t>27-Nov-20</a:t>
-            </a:fld>
+              <a:t>2021-02-11</a:t>
+            </a:r>
             <a:endParaRPr lang="en-US"/>
           </a:p>
         </p:txBody>
@@ -2381,10 +2734,10 @@
           <a:bodyPr/>
           <a:lstStyle/>
           <a:p>
-            <a:fld id="{8C16488A-8360-4894-8DFF-01D12F7C9940}" type="datetimeFigureOut">
+            <a:r>
               <a:rPr lang="en-US" smtClean="0"/>
-              <a:t>27-Nov-20</a:t>
-            </a:fld>
+              <a:t>2021-02-11</a:t>
+            </a:r>
             <a:endParaRPr lang="en-US"/>
           </a:p>
         </p:txBody>
@@ -2669,10 +3022,10 @@
           <a:bodyPr/>
           <a:lstStyle/>
           <a:p>
-            <a:fld id="{8C16488A-8360-4894-8DFF-01D12F7C9940}" type="datetimeFigureOut">
+            <a:r>
               <a:rPr lang="en-US" smtClean="0"/>
-              <a:t>27-Nov-20</a:t>
-            </a:fld>
+              <a:t>2021-02-11</a:t>
+            </a:r>
             <a:endParaRPr lang="en-US"/>
           </a:p>
         </p:txBody>
@@ -2910,10 +3263,10 @@
             </a:lvl1pPr>
           </a:lstStyle>
           <a:p>
-            <a:fld id="{8C16488A-8360-4894-8DFF-01D12F7C9940}" type="datetimeFigureOut">
+            <a:r>
               <a:rPr lang="en-US" smtClean="0"/>
-              <a:t>27-Nov-20</a:t>
-            </a:fld>
+              <a:t>2021-02-11</a:t>
+            </a:r>
             <a:endParaRPr lang="en-US"/>
           </a:p>
         </p:txBody>
@@ -3029,6 +3382,7 @@
     <p:sldLayoutId id="2147483658" r:id="rId10"/>
     <p:sldLayoutId id="2147483659" r:id="rId11"/>
   </p:sldLayoutIdLst>
+  <p:hf sldNum="0" hdr="0"/>
   <p:txStyles>
     <p:titleStyle>
       <a:lvl1pPr algn="l" defTabSz="914400" rtl="0" eaLnBrk="1" latinLnBrk="0" hangingPunct="1">
@@ -3702,6 +4056,48 @@
           </a:p>
         </p:txBody>
       </p:sp>
+      <p:sp>
+        <p:nvSpPr>
+          <p:cNvPr id="2" name="Date Placeholder 1"/>
+          <p:cNvSpPr>
+            <a:spLocks noGrp="1"/>
+          </p:cNvSpPr>
+          <p:nvPr>
+            <p:ph type="dt" sz="half" idx="10"/>
+          </p:nvPr>
+        </p:nvSpPr>
+        <p:spPr/>
+        <p:txBody>
+          <a:bodyPr/>
+          <a:lstStyle/>
+          <a:p>
+            <a:r>
+              <a:rPr lang="en-US" smtClean="0"/>
+              <a:t>2021-02-11</a:t>
+            </a:r>
+            <a:endParaRPr lang="en-US"/>
+          </a:p>
+        </p:txBody>
+      </p:sp>
+      <p:sp>
+        <p:nvSpPr>
+          <p:cNvPr id="3" name="Footer Placeholder 2"/>
+          <p:cNvSpPr>
+            <a:spLocks noGrp="1"/>
+          </p:cNvSpPr>
+          <p:nvPr>
+            <p:ph type="ftr" sz="quarter" idx="11"/>
+          </p:nvPr>
+        </p:nvSpPr>
+        <p:spPr/>
+        <p:txBody>
+          <a:bodyPr/>
+          <a:lstStyle/>
+          <a:p>
+            <a:endParaRPr lang="en-US"/>
+          </a:p>
+        </p:txBody>
+      </p:sp>
     </p:spTree>
     <p:extLst>
       <p:ext uri="{BB962C8B-B14F-4D97-AF65-F5344CB8AC3E}">
@@ -3995,6 +4391,48 @@
           </a:fontRef>
         </p:style>
       </p:cxnSp>
+      <p:sp>
+        <p:nvSpPr>
+          <p:cNvPr id="2" name="Date Placeholder 1"/>
+          <p:cNvSpPr>
+            <a:spLocks noGrp="1"/>
+          </p:cNvSpPr>
+          <p:nvPr>
+            <p:ph type="dt" sz="half" idx="10"/>
+          </p:nvPr>
+        </p:nvSpPr>
+        <p:spPr/>
+        <p:txBody>
+          <a:bodyPr/>
+          <a:lstStyle/>
+          <a:p>
+            <a:r>
+              <a:rPr lang="en-US" smtClean="0"/>
+              <a:t>2021-02-11</a:t>
+            </a:r>
+            <a:endParaRPr lang="en-US"/>
+          </a:p>
+        </p:txBody>
+      </p:sp>
+      <p:sp>
+        <p:nvSpPr>
+          <p:cNvPr id="3" name="Footer Placeholder 2"/>
+          <p:cNvSpPr>
+            <a:spLocks noGrp="1"/>
+          </p:cNvSpPr>
+          <p:nvPr>
+            <p:ph type="ftr" sz="quarter" idx="11"/>
+          </p:nvPr>
+        </p:nvSpPr>
+        <p:spPr/>
+        <p:txBody>
+          <a:bodyPr/>
+          <a:lstStyle/>
+          <a:p>
+            <a:endParaRPr lang="en-US"/>
+          </a:p>
+        </p:txBody>
+      </p:sp>
     </p:spTree>
     <p:extLst>
       <p:ext uri="{BB962C8B-B14F-4D97-AF65-F5344CB8AC3E}">
@@ -4074,7 +4512,7 @@
         </p:nvSpPr>
         <p:spPr>
           <a:xfrm>
-            <a:off x="1011996" y="6132786"/>
+            <a:off x="1011996" y="5869402"/>
             <a:ext cx="2046514" cy="369332"/>
           </a:xfrm>
           <a:prstGeom prst="rect">
@@ -4109,7 +4547,7 @@
         </p:nvSpPr>
         <p:spPr>
           <a:xfrm>
-            <a:off x="7731466" y="6132786"/>
+            <a:off x="7576081" y="5904416"/>
             <a:ext cx="2046514" cy="369332"/>
           </a:xfrm>
           <a:prstGeom prst="rect">
@@ -4421,7 +4859,7 @@
           </a:p>
           <a:p>
             <a:r>
-              <a:rPr lang="en-US" dirty="0"/>
+              <a:rPr lang="en-US" strike="sngStrike" dirty="0"/>
               <a:t>PC1 status on</a:t>
             </a:r>
           </a:p>
@@ -4519,7 +4957,7 @@
           </a:p>
           <a:p>
             <a:r>
-              <a:rPr lang="en-US" dirty="0"/>
+              <a:rPr lang="en-US" strike="sngStrike" dirty="0"/>
               <a:t>PC2 status on</a:t>
             </a:r>
           </a:p>
@@ -4641,6 +5079,48 @@
               <a:rPr lang="en-US" sz="1600" i="1" dirty="0"/>
               <a:t>Lead4 – TT693</a:t>
             </a:r>
+          </a:p>
+        </p:txBody>
+      </p:sp>
+      <p:sp>
+        <p:nvSpPr>
+          <p:cNvPr id="3" name="Date Placeholder 2"/>
+          <p:cNvSpPr>
+            <a:spLocks noGrp="1"/>
+          </p:cNvSpPr>
+          <p:nvPr>
+            <p:ph type="dt" sz="half" idx="10"/>
+          </p:nvPr>
+        </p:nvSpPr>
+        <p:spPr/>
+        <p:txBody>
+          <a:bodyPr/>
+          <a:lstStyle/>
+          <a:p>
+            <a:r>
+              <a:rPr lang="en-US" smtClean="0"/>
+              <a:t>2021-02-11</a:t>
+            </a:r>
+            <a:endParaRPr lang="en-US"/>
+          </a:p>
+        </p:txBody>
+      </p:sp>
+      <p:sp>
+        <p:nvSpPr>
+          <p:cNvPr id="9" name="Footer Placeholder 8"/>
+          <p:cNvSpPr>
+            <a:spLocks noGrp="1"/>
+          </p:cNvSpPr>
+          <p:nvPr>
+            <p:ph type="ftr" sz="quarter" idx="11"/>
+          </p:nvPr>
+        </p:nvSpPr>
+        <p:spPr/>
+        <p:txBody>
+          <a:bodyPr/>
+          <a:lstStyle/>
+          <a:p>
+            <a:endParaRPr lang="en-US"/>
           </a:p>
         </p:txBody>
       </p:sp>
@@ -4723,7 +5203,7 @@
         </p:nvSpPr>
         <p:spPr>
           <a:xfrm>
-            <a:off x="315685" y="1151709"/>
+            <a:off x="290747" y="926403"/>
             <a:ext cx="11451771" cy="5632311"/>
           </a:xfrm>
           <a:prstGeom prst="rect">
@@ -4929,6 +5409,48 @@
               <a:rPr lang="en-US" sz="1600" i="1" dirty="0"/>
               <a:t>Power converter 2 – MAG-RCH2:I_MEAS</a:t>
             </a:r>
+          </a:p>
+        </p:txBody>
+      </p:sp>
+      <p:sp>
+        <p:nvSpPr>
+          <p:cNvPr id="2" name="Date Placeholder 1"/>
+          <p:cNvSpPr>
+            <a:spLocks noGrp="1"/>
+          </p:cNvSpPr>
+          <p:nvPr>
+            <p:ph type="dt" sz="half" idx="10"/>
+          </p:nvPr>
+        </p:nvSpPr>
+        <p:spPr/>
+        <p:txBody>
+          <a:bodyPr/>
+          <a:lstStyle/>
+          <a:p>
+            <a:r>
+              <a:rPr lang="en-US" smtClean="0"/>
+              <a:t>2021-02-11</a:t>
+            </a:r>
+            <a:endParaRPr lang="en-US"/>
+          </a:p>
+        </p:txBody>
+      </p:sp>
+      <p:sp>
+        <p:nvSpPr>
+          <p:cNvPr id="3" name="Footer Placeholder 2"/>
+          <p:cNvSpPr>
+            <a:spLocks noGrp="1"/>
+          </p:cNvSpPr>
+          <p:nvPr>
+            <p:ph type="ftr" sz="quarter" idx="11"/>
+          </p:nvPr>
+        </p:nvSpPr>
+        <p:spPr/>
+        <p:txBody>
+          <a:bodyPr/>
+          <a:lstStyle/>
+          <a:p>
+            <a:endParaRPr lang="en-US"/>
           </a:p>
         </p:txBody>
       </p:sp>
@@ -5238,4 +5760,265 @@
     </a:ext>
   </a:extLst>
 </a:theme>
+</file>
+
+<file path=ppt/theme/theme2.xml><?xml version="1.0" encoding="utf-8"?>
+<a:theme xmlns:a="http://schemas.openxmlformats.org/drawingml/2006/main" name="Office Theme">
+  <a:themeElements>
+    <a:clrScheme name="Office">
+      <a:dk1>
+        <a:sysClr val="windowText" lastClr="000000"/>
+      </a:dk1>
+      <a:lt1>
+        <a:sysClr val="window" lastClr="FFFFFF"/>
+      </a:lt1>
+      <a:dk2>
+        <a:srgbClr val="44546A"/>
+      </a:dk2>
+      <a:lt2>
+        <a:srgbClr val="E7E6E6"/>
+      </a:lt2>
+      <a:accent1>
+        <a:srgbClr val="5B9BD5"/>
+      </a:accent1>
+      <a:accent2>
+        <a:srgbClr val="ED7D31"/>
+      </a:accent2>
+      <a:accent3>
+        <a:srgbClr val="A5A5A5"/>
+      </a:accent3>
+      <a:accent4>
+        <a:srgbClr val="FFC000"/>
+      </a:accent4>
+      <a:accent5>
+        <a:srgbClr val="4472C4"/>
+      </a:accent5>
+      <a:accent6>
+        <a:srgbClr val="70AD47"/>
+      </a:accent6>
+      <a:hlink>
+        <a:srgbClr val="0563C1"/>
+      </a:hlink>
+      <a:folHlink>
+        <a:srgbClr val="954F72"/>
+      </a:folHlink>
+    </a:clrScheme>
+    <a:fontScheme name="Office">
+      <a:majorFont>
+        <a:latin typeface="Calibri Light" panose="020F0302020204030204"/>
+        <a:ea typeface=""/>
+        <a:cs typeface=""/>
+        <a:font script="Jpan" typeface="游ゴシック Light"/>
+        <a:font script="Hang" typeface="맑은 고딕"/>
+        <a:font script="Hans" typeface="等线 Light"/>
+        <a:font script="Hant" typeface="新細明體"/>
+        <a:font script="Arab" typeface="Times New Roman"/>
+        <a:font script="Hebr" typeface="Times New Roman"/>
+        <a:font script="Thai" typeface="Angsana New"/>
+        <a:font script="Ethi" typeface="Nyala"/>
+        <a:font script="Beng" typeface="Vrinda"/>
+        <a:font script="Gujr" typeface="Shruti"/>
+        <a:font script="Khmr" typeface="MoolBoran"/>
+        <a:font script="Knda" typeface="Tunga"/>
+        <a:font script="Guru" typeface="Raavi"/>
+        <a:font script="Cans" typeface="Euphemia"/>
+        <a:font script="Cher" typeface="Plantagenet Cherokee"/>
+        <a:font script="Yiii" typeface="Microsoft Yi Baiti"/>
+        <a:font script="Tibt" typeface="Microsoft Himalaya"/>
+        <a:font script="Thaa" typeface="MV Boli"/>
+        <a:font script="Deva" typeface="Mangal"/>
+        <a:font script="Telu" typeface="Gautami"/>
+        <a:font script="Taml" typeface="Latha"/>
+        <a:font script="Syrc" typeface="Estrangelo Edessa"/>
+        <a:font script="Orya" typeface="Kalinga"/>
+        <a:font script="Mlym" typeface="Kartika"/>
+        <a:font script="Laoo" typeface="DokChampa"/>
+        <a:font script="Sinh" typeface="Iskoola Pota"/>
+        <a:font script="Mong" typeface="Mongolian Baiti"/>
+        <a:font script="Viet" typeface="Times New Roman"/>
+        <a:font script="Uigh" typeface="Microsoft Uighur"/>
+        <a:font script="Geor" typeface="Sylfaen"/>
+      </a:majorFont>
+      <a:minorFont>
+        <a:latin typeface="Calibri" panose="020F0502020204030204"/>
+        <a:ea typeface=""/>
+        <a:cs typeface=""/>
+        <a:font script="Jpan" typeface="游ゴシック"/>
+        <a:font script="Hang" typeface="맑은 고딕"/>
+        <a:font script="Hans" typeface="等线"/>
+        <a:font script="Hant" typeface="新細明體"/>
+        <a:font script="Arab" typeface="Arial"/>
+        <a:font script="Hebr" typeface="Arial"/>
+        <a:font script="Thai" typeface="Cordia New"/>
+        <a:font script="Ethi" typeface="Nyala"/>
+        <a:font script="Beng" typeface="Vrinda"/>
+        <a:font script="Gujr" typeface="Shruti"/>
+        <a:font script="Khmr" typeface="DaunPenh"/>
+        <a:font script="Knda" typeface="Tunga"/>
+        <a:font script="Guru" typeface="Raavi"/>
+        <a:font script="Cans" typeface="Euphemia"/>
+        <a:font script="Cher" typeface="Plantagenet Cherokee"/>
+        <a:font script="Yiii" typeface="Microsoft Yi Baiti"/>
+        <a:font script="Tibt" typeface="Microsoft Himalaya"/>
+        <a:font script="Thaa" typeface="MV Boli"/>
+        <a:font script="Deva" typeface="Mangal"/>
+        <a:font script="Telu" typeface="Gautami"/>
+        <a:font script="Taml" typeface="Latha"/>
+        <a:font script="Syrc" typeface="Estrangelo Edessa"/>
+        <a:font script="Orya" typeface="Kalinga"/>
+        <a:font script="Mlym" typeface="Kartika"/>
+        <a:font script="Laoo" typeface="DokChampa"/>
+        <a:font script="Sinh" typeface="Iskoola Pota"/>
+        <a:font script="Mong" typeface="Mongolian Baiti"/>
+        <a:font script="Viet" typeface="Arial"/>
+        <a:font script="Uigh" typeface="Microsoft Uighur"/>
+        <a:font script="Geor" typeface="Sylfaen"/>
+      </a:minorFont>
+    </a:fontScheme>
+    <a:fmtScheme name="Office">
+      <a:fillStyleLst>
+        <a:solidFill>
+          <a:schemeClr val="phClr"/>
+        </a:solidFill>
+        <a:gradFill rotWithShape="1">
+          <a:gsLst>
+            <a:gs pos="0">
+              <a:schemeClr val="phClr">
+                <a:lumMod val="110000"/>
+                <a:satMod val="105000"/>
+                <a:tint val="67000"/>
+              </a:schemeClr>
+            </a:gs>
+            <a:gs pos="50000">
+              <a:schemeClr val="phClr">
+                <a:lumMod val="105000"/>
+                <a:satMod val="103000"/>
+                <a:tint val="73000"/>
+              </a:schemeClr>
+            </a:gs>
+            <a:gs pos="100000">
+              <a:schemeClr val="phClr">
+                <a:lumMod val="105000"/>
+                <a:satMod val="109000"/>
+                <a:tint val="81000"/>
+              </a:schemeClr>
+            </a:gs>
+          </a:gsLst>
+          <a:lin ang="5400000" scaled="0"/>
+        </a:gradFill>
+        <a:gradFill rotWithShape="1">
+          <a:gsLst>
+            <a:gs pos="0">
+              <a:schemeClr val="phClr">
+                <a:satMod val="103000"/>
+                <a:lumMod val="102000"/>
+                <a:tint val="94000"/>
+              </a:schemeClr>
+            </a:gs>
+            <a:gs pos="50000">
+              <a:schemeClr val="phClr">
+                <a:satMod val="110000"/>
+                <a:lumMod val="100000"/>
+                <a:shade val="100000"/>
+              </a:schemeClr>
+            </a:gs>
+            <a:gs pos="100000">
+              <a:schemeClr val="phClr">
+                <a:lumMod val="99000"/>
+                <a:satMod val="120000"/>
+                <a:shade val="78000"/>
+              </a:schemeClr>
+            </a:gs>
+          </a:gsLst>
+          <a:lin ang="5400000" scaled="0"/>
+        </a:gradFill>
+      </a:fillStyleLst>
+      <a:lnStyleLst>
+        <a:ln w="6350" cap="flat" cmpd="sng" algn="ctr">
+          <a:solidFill>
+            <a:schemeClr val="phClr"/>
+          </a:solidFill>
+          <a:prstDash val="solid"/>
+          <a:miter lim="800000"/>
+        </a:ln>
+        <a:ln w="12700" cap="flat" cmpd="sng" algn="ctr">
+          <a:solidFill>
+            <a:schemeClr val="phClr"/>
+          </a:solidFill>
+          <a:prstDash val="solid"/>
+          <a:miter lim="800000"/>
+        </a:ln>
+        <a:ln w="19050" cap="flat" cmpd="sng" algn="ctr">
+          <a:solidFill>
+            <a:schemeClr val="phClr"/>
+          </a:solidFill>
+          <a:prstDash val="solid"/>
+          <a:miter lim="800000"/>
+        </a:ln>
+      </a:lnStyleLst>
+      <a:effectStyleLst>
+        <a:effectStyle>
+          <a:effectLst/>
+        </a:effectStyle>
+        <a:effectStyle>
+          <a:effectLst/>
+        </a:effectStyle>
+        <a:effectStyle>
+          <a:effectLst>
+            <a:outerShdw blurRad="57150" dist="19050" dir="5400000" algn="ctr" rotWithShape="0">
+              <a:srgbClr val="000000">
+                <a:alpha val="63000"/>
+              </a:srgbClr>
+            </a:outerShdw>
+          </a:effectLst>
+        </a:effectStyle>
+      </a:effectStyleLst>
+      <a:bgFillStyleLst>
+        <a:solidFill>
+          <a:schemeClr val="phClr"/>
+        </a:solidFill>
+        <a:solidFill>
+          <a:schemeClr val="phClr">
+            <a:tint val="95000"/>
+            <a:satMod val="170000"/>
+          </a:schemeClr>
+        </a:solidFill>
+        <a:gradFill rotWithShape="1">
+          <a:gsLst>
+            <a:gs pos="0">
+              <a:schemeClr val="phClr">
+                <a:tint val="93000"/>
+                <a:satMod val="150000"/>
+                <a:shade val="98000"/>
+                <a:lumMod val="102000"/>
+              </a:schemeClr>
+            </a:gs>
+            <a:gs pos="50000">
+              <a:schemeClr val="phClr">
+                <a:tint val="98000"/>
+                <a:satMod val="130000"/>
+                <a:shade val="90000"/>
+                <a:lumMod val="103000"/>
+              </a:schemeClr>
+            </a:gs>
+            <a:gs pos="100000">
+              <a:schemeClr val="phClr">
+                <a:shade val="63000"/>
+                <a:satMod val="120000"/>
+              </a:schemeClr>
+            </a:gs>
+          </a:gsLst>
+          <a:lin ang="5400000" scaled="0"/>
+        </a:gradFill>
+      </a:bgFillStyleLst>
+    </a:fmtScheme>
+  </a:themeElements>
+  <a:objectDefaults/>
+  <a:extraClrSchemeLst/>
+  <a:extLst>
+    <a:ext uri="{05A4C25C-085E-4340-85A3-A5531E510DB2}">
+      <thm15:themeFamily xmlns:thm15="http://schemas.microsoft.com/office/thememl/2012/main" name="Office Theme" id="{62F939B6-93AF-4DB8-9C6B-D6C7DFDC589F}" vid="{4A3C46E8-61CC-4603-A589-7422A47A8E4A}"/>
+    </a:ext>
+  </a:extLst>
+</a:theme>
 </file>
</xml_diff>

<commit_message>
Updated documentation - new signals for polarity switch motors.
</commit_message>
<xml_diff>
--- a/doc/Logic_v2.pptx
+++ b/doc/Logic_v2.pptx
@@ -5,13 +5,14 @@
     <p:sldMasterId id="2147483648" r:id="rId1"/>
   </p:sldMasterIdLst>
   <p:notesMasterIdLst>
-    <p:notesMasterId r:id="rId6"/>
+    <p:notesMasterId r:id="rId7"/>
   </p:notesMasterIdLst>
   <p:sldIdLst>
     <p:sldId id="256" r:id="rId2"/>
     <p:sldId id="257" r:id="rId3"/>
     <p:sldId id="258" r:id="rId4"/>
     <p:sldId id="259" r:id="rId5"/>
+    <p:sldId id="260" r:id="rId6"/>
   </p:sldIdLst>
   <p:sldSz cx="12192000" cy="6858000"/>
   <p:notesSz cx="6858000" cy="9144000"/>
@@ -200,7 +201,7 @@
           <a:p>
             <a:fld id="{2AD46016-8A63-4383-BAF1-E352D74E616E}" type="datetimeFigureOut">
               <a:rPr lang="sv-SE" smtClean="0"/>
-              <a:t>2021-02-11</a:t>
+              <a:t>2022-02-07</a:t>
             </a:fld>
             <a:endParaRPr lang="sv-SE"/>
           </a:p>
@@ -5458,6 +5459,231 @@
     <p:extLst>
       <p:ext uri="{BB962C8B-B14F-4D97-AF65-F5344CB8AC3E}">
         <p14:creationId xmlns:p14="http://schemas.microsoft.com/office/powerpoint/2010/main" val="1022271635"/>
+      </p:ext>
+    </p:extLst>
+  </p:cSld>
+  <p:clrMapOvr>
+    <a:masterClrMapping/>
+  </p:clrMapOvr>
+</p:sld>
+</file>
+
+<file path=ppt/slides/slide5.xml><?xml version="1.0" encoding="utf-8"?>
+<p:sld xmlns:a="http://schemas.openxmlformats.org/drawingml/2006/main" xmlns:r="http://schemas.openxmlformats.org/officeDocument/2006/relationships" xmlns:p="http://schemas.openxmlformats.org/presentationml/2006/main">
+  <p:cSld>
+    <p:spTree>
+      <p:nvGrpSpPr>
+        <p:cNvPr id="1" name=""/>
+        <p:cNvGrpSpPr/>
+        <p:nvPr/>
+      </p:nvGrpSpPr>
+      <p:grpSpPr>
+        <a:xfrm>
+          <a:off x="0" y="0"/>
+          <a:ext cx="0" cy="0"/>
+          <a:chOff x="0" y="0"/>
+          <a:chExt cx="0" cy="0"/>
+        </a:xfrm>
+      </p:grpSpPr>
+      <p:sp>
+        <p:nvSpPr>
+          <p:cNvPr id="3" name="Content Placeholder 2"/>
+          <p:cNvSpPr>
+            <a:spLocks noGrp="1"/>
+          </p:cNvSpPr>
+          <p:nvPr>
+            <p:ph idx="1"/>
+          </p:nvPr>
+        </p:nvSpPr>
+        <p:spPr>
+          <a:xfrm>
+            <a:off x="838200" y="426721"/>
+            <a:ext cx="10515600" cy="591311"/>
+          </a:xfrm>
+        </p:spPr>
+        <p:txBody>
+          <a:bodyPr/>
+          <a:lstStyle/>
+          <a:p>
+            <a:pPr marL="0" indent="0">
+              <a:buNone/>
+            </a:pPr>
+            <a:r>
+              <a:rPr lang="sv-SE" dirty="0" smtClean="0"/>
+              <a:t>Polarity switch motor controller</a:t>
+            </a:r>
+          </a:p>
+          <a:p>
+            <a:pPr marL="0" indent="0">
+              <a:buNone/>
+            </a:pPr>
+            <a:endParaRPr lang="sv-SE" dirty="0"/>
+          </a:p>
+        </p:txBody>
+      </p:sp>
+      <p:sp>
+        <p:nvSpPr>
+          <p:cNvPr id="4" name="Date Placeholder 3"/>
+          <p:cNvSpPr>
+            <a:spLocks noGrp="1"/>
+          </p:cNvSpPr>
+          <p:nvPr>
+            <p:ph type="dt" sz="half" idx="10"/>
+          </p:nvPr>
+        </p:nvSpPr>
+        <p:spPr/>
+        <p:txBody>
+          <a:bodyPr/>
+          <a:lstStyle/>
+          <a:p>
+            <a:r>
+              <a:rPr lang="en-US" dirty="0" smtClean="0"/>
+              <a:t>2022-02-07</a:t>
+            </a:r>
+            <a:endParaRPr lang="en-US" dirty="0"/>
+          </a:p>
+        </p:txBody>
+      </p:sp>
+      <p:sp>
+        <p:nvSpPr>
+          <p:cNvPr id="5" name="Footer Placeholder 4"/>
+          <p:cNvSpPr>
+            <a:spLocks noGrp="1"/>
+          </p:cNvSpPr>
+          <p:nvPr>
+            <p:ph type="ftr" sz="quarter" idx="11"/>
+          </p:nvPr>
+        </p:nvSpPr>
+        <p:spPr/>
+        <p:txBody>
+          <a:bodyPr/>
+          <a:lstStyle/>
+          <a:p>
+            <a:endParaRPr lang="en-US"/>
+          </a:p>
+        </p:txBody>
+      </p:sp>
+      <p:sp>
+        <p:nvSpPr>
+          <p:cNvPr id="6" name="TextBox 5"/>
+          <p:cNvSpPr txBox="1"/>
+          <p:nvPr/>
+        </p:nvSpPr>
+        <p:spPr>
+          <a:xfrm>
+            <a:off x="505968" y="1548384"/>
+            <a:ext cx="11198352" cy="3416320"/>
+          </a:xfrm>
+          <a:prstGeom prst="rect">
+            <a:avLst/>
+          </a:prstGeom>
+          <a:noFill/>
+        </p:spPr>
+        <p:txBody>
+          <a:bodyPr wrap="square" rtlCol="0">
+            <a:spAutoFit/>
+          </a:bodyPr>
+          <a:lstStyle/>
+          <a:p>
+            <a:r>
+              <a:rPr lang="sv-SE" dirty="0" smtClean="0"/>
+              <a:t>Buttons:</a:t>
+            </a:r>
+          </a:p>
+          <a:p>
+            <a:r>
+              <a:rPr lang="sv-SE" dirty="0" smtClean="0"/>
+              <a:t>Move motor 1 towards pos 1</a:t>
+            </a:r>
+          </a:p>
+          <a:p>
+            <a:r>
+              <a:rPr lang="sv-SE" dirty="0" smtClean="0"/>
+              <a:t>	Condition: sw1 pos1 closed (input signal high)</a:t>
+            </a:r>
+          </a:p>
+          <a:p>
+            <a:r>
+              <a:rPr lang="sv-SE" dirty="0" smtClean="0"/>
+              <a:t>Move motor 1 towards pos 2</a:t>
+            </a:r>
+          </a:p>
+          <a:p>
+            <a:r>
+              <a:rPr lang="sv-SE" dirty="0" smtClean="0"/>
+              <a:t>	Condition: sw1 pos2 closed (input signal high)</a:t>
+            </a:r>
+          </a:p>
+          <a:p>
+            <a:r>
+              <a:rPr lang="sv-SE" dirty="0" smtClean="0"/>
+              <a:t>Move motor 2 towards pos 1</a:t>
+            </a:r>
+          </a:p>
+          <a:p>
+            <a:r>
+              <a:rPr lang="sv-SE" dirty="0" smtClean="0"/>
+              <a:t>	Condition</a:t>
+            </a:r>
+            <a:r>
+              <a:rPr lang="sv-SE" dirty="0"/>
+              <a:t>: </a:t>
+            </a:r>
+            <a:r>
+              <a:rPr lang="sv-SE" dirty="0" smtClean="0"/>
+              <a:t>sw2 </a:t>
+            </a:r>
+            <a:r>
+              <a:rPr lang="sv-SE" dirty="0"/>
+              <a:t>pos1 closed (input signal high</a:t>
+            </a:r>
+            <a:r>
+              <a:rPr lang="sv-SE" dirty="0" smtClean="0"/>
+              <a:t>)</a:t>
+            </a:r>
+          </a:p>
+          <a:p>
+            <a:r>
+              <a:rPr lang="sv-SE" dirty="0" smtClean="0"/>
+              <a:t>Move motor 2 towards pos 2</a:t>
+            </a:r>
+          </a:p>
+          <a:p>
+            <a:r>
+              <a:rPr lang="sv-SE" dirty="0" smtClean="0"/>
+              <a:t>	Condition</a:t>
+            </a:r>
+            <a:r>
+              <a:rPr lang="sv-SE" dirty="0"/>
+              <a:t>: </a:t>
+            </a:r>
+            <a:r>
+              <a:rPr lang="sv-SE" dirty="0" smtClean="0"/>
+              <a:t>sw2 pos2 </a:t>
+            </a:r>
+            <a:r>
+              <a:rPr lang="sv-SE" dirty="0"/>
+              <a:t>closed (input signal high)</a:t>
+            </a:r>
+          </a:p>
+          <a:p>
+            <a:endParaRPr lang="sv-SE" dirty="0" smtClean="0"/>
+          </a:p>
+          <a:p>
+            <a:r>
+              <a:rPr lang="sv-SE" smtClean="0"/>
+              <a:t>General interlock:</a:t>
+            </a:r>
+          </a:p>
+          <a:p>
+            <a:endParaRPr lang="sv-SE" dirty="0"/>
+          </a:p>
+        </p:txBody>
+      </p:sp>
+    </p:spTree>
+    <p:extLst>
+      <p:ext uri="{BB962C8B-B14F-4D97-AF65-F5344CB8AC3E}">
+        <p14:creationId xmlns:p14="http://schemas.microsoft.com/office/powerpoint/2010/main" val="158468758"/>
       </p:ext>
     </p:extLst>
   </p:cSld>

</xml_diff>

<commit_message>
Added support for the polarity switches.
</commit_message>
<xml_diff>
--- a/doc/Logic_v2.pptx
+++ b/doc/Logic_v2.pptx
@@ -201,7 +201,7 @@
           <a:p>
             <a:fld id="{2AD46016-8A63-4383-BAF1-E352D74E616E}" type="datetimeFigureOut">
               <a:rPr lang="sv-SE" smtClean="0"/>
-              <a:t>2022-02-07</a:t>
+              <a:t>2022-02-15</a:t>
             </a:fld>
             <a:endParaRPr lang="sv-SE"/>
           </a:p>
@@ -5204,8 +5204,8 @@
         </p:nvSpPr>
         <p:spPr>
           <a:xfrm>
-            <a:off x="290747" y="926403"/>
-            <a:ext cx="11451771" cy="5632311"/>
+            <a:off x="233335" y="3237953"/>
+            <a:ext cx="11451771" cy="3416320"/>
           </a:xfrm>
           <a:prstGeom prst="rect">
             <a:avLst/>
@@ -5219,83 +5219,12 @@
           <a:lstStyle/>
           <a:p>
             <a:r>
-              <a:rPr lang="en-US" dirty="0"/>
-              <a:t>Buttons:</a:t>
-            </a:r>
-          </a:p>
-          <a:p>
-            <a:r>
-              <a:rPr lang="en-US" dirty="0"/>
-              <a:t>  Reset EE1 Pulse 0_1_0: 500 </a:t>
-            </a:r>
-            <a:r>
-              <a:rPr lang="en-US" dirty="0" err="1"/>
-              <a:t>ms</a:t>
-            </a:r>
-            <a:endParaRPr lang="en-US" dirty="0"/>
-          </a:p>
-          <a:p>
-            <a:r>
-              <a:rPr lang="en-US" dirty="0"/>
-              <a:t>  Close EE1 Pulse 0_1_0: 500 </a:t>
-            </a:r>
-            <a:r>
-              <a:rPr lang="en-US" dirty="0" err="1"/>
-              <a:t>ms</a:t>
-            </a:r>
-            <a:endParaRPr lang="en-US" dirty="0"/>
-          </a:p>
-          <a:p>
-            <a:r>
-              <a:rPr lang="en-US" dirty="0"/>
-              <a:t>  Open request EE1 (inversed logic) Pulse 1_0_1: 500 </a:t>
-            </a:r>
-            <a:r>
-              <a:rPr lang="en-US" dirty="0" err="1"/>
-              <a:t>ms</a:t>
-            </a:r>
-            <a:endParaRPr lang="en-US" dirty="0"/>
-          </a:p>
-          <a:p>
-            <a:r>
-              <a:rPr lang="en-US" dirty="0"/>
-              <a:t>  Reset EE1 Pulse 0_1_0: 500 </a:t>
-            </a:r>
-            <a:r>
-              <a:rPr lang="en-US" dirty="0" err="1"/>
-              <a:t>ms</a:t>
-            </a:r>
-            <a:endParaRPr lang="en-US" dirty="0"/>
-          </a:p>
-          <a:p>
-            <a:r>
-              <a:rPr lang="en-US" dirty="0"/>
-              <a:t>  Close EE2 Pulse 0_1_0: 500 </a:t>
-            </a:r>
-            <a:r>
-              <a:rPr lang="en-US" dirty="0" err="1"/>
-              <a:t>ms</a:t>
-            </a:r>
-            <a:endParaRPr lang="en-US" dirty="0"/>
-          </a:p>
-          <a:p>
-            <a:r>
-              <a:rPr lang="en-US" dirty="0"/>
-              <a:t>  Open request EE2 (inversed logic) Pulse 1_0_1: 500 </a:t>
-            </a:r>
-            <a:r>
-              <a:rPr lang="en-US" dirty="0" err="1"/>
-              <a:t>ms</a:t>
-            </a:r>
-            <a:endParaRPr lang="en-US" dirty="0"/>
-          </a:p>
-          <a:p>
-            <a:endParaRPr lang="en-US" dirty="0"/>
-          </a:p>
-          <a:p>
-            <a:r>
-              <a:rPr lang="en-US" dirty="0"/>
-              <a:t>Param:</a:t>
+              <a:rPr lang="en-US" dirty="0" err="1" smtClean="0"/>
+              <a:t>Param</a:t>
+            </a:r>
+            <a:r>
+              <a:rPr lang="en-US" dirty="0"/>
+              <a:t>:</a:t>
             </a:r>
           </a:p>
           <a:p>
@@ -5452,6 +5381,182 @@
           <a:lstStyle/>
           <a:p>
             <a:endParaRPr lang="en-US"/>
+          </a:p>
+        </p:txBody>
+      </p:sp>
+      <p:sp>
+        <p:nvSpPr>
+          <p:cNvPr id="8" name="TextBox 7"/>
+          <p:cNvSpPr txBox="1"/>
+          <p:nvPr/>
+        </p:nvSpPr>
+        <p:spPr>
+          <a:xfrm>
+            <a:off x="541968" y="981495"/>
+            <a:ext cx="5417252" cy="2308324"/>
+          </a:xfrm>
+          <a:prstGeom prst="rect">
+            <a:avLst/>
+          </a:prstGeom>
+          <a:noFill/>
+        </p:spPr>
+        <p:txBody>
+          <a:bodyPr wrap="none" rtlCol="0">
+            <a:spAutoFit/>
+          </a:bodyPr>
+          <a:lstStyle/>
+          <a:p>
+            <a:r>
+              <a:rPr lang="en-US" dirty="0" smtClean="0"/>
+              <a:t>Buttons:</a:t>
+            </a:r>
+          </a:p>
+          <a:p>
+            <a:r>
+              <a:rPr lang="en-US" dirty="0" smtClean="0"/>
+              <a:t>Reset </a:t>
+            </a:r>
+            <a:r>
+              <a:rPr lang="en-US" dirty="0"/>
+              <a:t>EE1 Pulse 0_1_0: 500 </a:t>
+            </a:r>
+            <a:r>
+              <a:rPr lang="en-US" dirty="0" err="1"/>
+              <a:t>ms</a:t>
+            </a:r>
+            <a:endParaRPr lang="en-US" dirty="0"/>
+          </a:p>
+          <a:p>
+            <a:r>
+              <a:rPr lang="en-US" dirty="0"/>
+              <a:t>  Close EE1 Pulse 0_1_0: 500 </a:t>
+            </a:r>
+            <a:r>
+              <a:rPr lang="en-US" dirty="0" err="1"/>
+              <a:t>ms</a:t>
+            </a:r>
+            <a:endParaRPr lang="en-US" dirty="0"/>
+          </a:p>
+          <a:p>
+            <a:r>
+              <a:rPr lang="en-US" dirty="0"/>
+              <a:t>  Open request EE1 (inversed logic) Pulse 1_0_1: 500 </a:t>
+            </a:r>
+            <a:r>
+              <a:rPr lang="en-US" dirty="0" err="1"/>
+              <a:t>ms</a:t>
+            </a:r>
+            <a:endParaRPr lang="en-US" dirty="0"/>
+          </a:p>
+          <a:p>
+            <a:r>
+              <a:rPr lang="en-US" dirty="0"/>
+              <a:t>  Reset EE1 Pulse 0_1_0: 500 </a:t>
+            </a:r>
+            <a:r>
+              <a:rPr lang="en-US" dirty="0" err="1"/>
+              <a:t>ms</a:t>
+            </a:r>
+            <a:endParaRPr lang="en-US" dirty="0"/>
+          </a:p>
+          <a:p>
+            <a:r>
+              <a:rPr lang="en-US" dirty="0"/>
+              <a:t>  Close EE2 Pulse 0_1_0: 500 </a:t>
+            </a:r>
+            <a:r>
+              <a:rPr lang="en-US" dirty="0" err="1"/>
+              <a:t>ms</a:t>
+            </a:r>
+            <a:endParaRPr lang="en-US" dirty="0"/>
+          </a:p>
+          <a:p>
+            <a:r>
+              <a:rPr lang="en-US" dirty="0"/>
+              <a:t>  Open request EE2 (inversed logic) Pulse 1_0_1: 500 </a:t>
+            </a:r>
+            <a:r>
+              <a:rPr lang="en-US" dirty="0" err="1"/>
+              <a:t>ms</a:t>
+            </a:r>
+            <a:endParaRPr lang="en-US" dirty="0"/>
+          </a:p>
+          <a:p>
+            <a:endParaRPr lang="sv-SE" dirty="0"/>
+          </a:p>
+        </p:txBody>
+      </p:sp>
+      <p:sp>
+        <p:nvSpPr>
+          <p:cNvPr id="9" name="Rectangle 8"/>
+          <p:cNvSpPr/>
+          <p:nvPr/>
+        </p:nvSpPr>
+        <p:spPr>
+          <a:xfrm>
+            <a:off x="5959219" y="1258494"/>
+            <a:ext cx="6366391" cy="1477328"/>
+          </a:xfrm>
+          <a:prstGeom prst="rect">
+            <a:avLst/>
+          </a:prstGeom>
+        </p:spPr>
+        <p:txBody>
+          <a:bodyPr wrap="square">
+            <a:spAutoFit/>
+          </a:bodyPr>
+          <a:lstStyle/>
+          <a:p>
+            <a:pPr marL="285750" indent="-285750">
+              <a:buFont typeface="Wingdings" panose="05000000000000000000" pitchFamily="2" charset="2"/>
+              <a:buChar char="§"/>
+            </a:pPr>
+            <a:r>
+              <a:rPr lang="en-US" dirty="0" smtClean="0"/>
+              <a:t>Change polarity switch motor direction: </a:t>
+            </a:r>
+            <a:r>
+              <a:rPr lang="en-US" dirty="0"/>
+              <a:t>Pulse 0_1_0: 500 </a:t>
+            </a:r>
+            <a:r>
+              <a:rPr lang="en-US" dirty="0" err="1"/>
+              <a:t>ms</a:t>
+            </a:r>
+            <a:endParaRPr lang="en-US" dirty="0"/>
+          </a:p>
+          <a:p>
+            <a:pPr marL="285750" indent="-285750">
+              <a:buFont typeface="Wingdings" panose="05000000000000000000" pitchFamily="2" charset="2"/>
+              <a:buChar char="§"/>
+            </a:pPr>
+            <a:r>
+              <a:rPr lang="en-US" dirty="0" smtClean="0"/>
+              <a:t>Switch polarity for PC1: Pulse 0_1_0 for 5 s or until reaching    end switch in the direction of movement</a:t>
+            </a:r>
+          </a:p>
+          <a:p>
+            <a:pPr marL="285750" indent="-285750">
+              <a:buFont typeface="Wingdings" panose="05000000000000000000" pitchFamily="2" charset="2"/>
+              <a:buChar char="§"/>
+            </a:pPr>
+            <a:r>
+              <a:rPr lang="en-US" dirty="0" smtClean="0"/>
+              <a:t>Switch </a:t>
+            </a:r>
+            <a:r>
+              <a:rPr lang="en-US" dirty="0"/>
+              <a:t>polarity for </a:t>
+            </a:r>
+            <a:r>
+              <a:rPr lang="en-US" dirty="0" smtClean="0"/>
+              <a:t>PC2: </a:t>
+            </a:r>
+            <a:r>
+              <a:rPr lang="en-US" dirty="0"/>
+              <a:t>Pulse 0_1_0 for 5 s or until reaching    end switch in the direction of movement</a:t>
+            </a:r>
+            <a:endParaRPr lang="en-US" dirty="0"/>
           </a:p>
         </p:txBody>
       </p:sp>
@@ -5571,8 +5676,8 @@
         </p:nvSpPr>
         <p:spPr>
           <a:xfrm>
-            <a:off x="505968" y="1548384"/>
-            <a:ext cx="11198352" cy="3416320"/>
+            <a:off x="681332" y="1573436"/>
+            <a:ext cx="11198352" cy="3139321"/>
           </a:xfrm>
           <a:prstGeom prst="rect">
             <a:avLst/>
@@ -5599,8 +5704,13 @@
           <a:p>
             <a:r>
               <a:rPr lang="sv-SE" dirty="0" smtClean="0"/>
-              <a:t>	Condition: sw1 pos1 closed (input signal high)</a:t>
-            </a:r>
+              <a:t>	Condition: sw1 pos1 closed (input signal high</a:t>
+            </a:r>
+            <a:r>
+              <a:rPr lang="sv-SE" dirty="0" smtClean="0"/>
+              <a:t>)</a:t>
+            </a:r>
+            <a:endParaRPr lang="sv-SE" dirty="0" smtClean="0"/>
           </a:p>
           <a:p>
             <a:r>
@@ -5611,8 +5721,13 @@
           <a:p>
             <a:r>
               <a:rPr lang="sv-SE" dirty="0" smtClean="0"/>
-              <a:t>	Condition: sw1 pos2 closed (input signal high)</a:t>
-            </a:r>
+              <a:t>	Condition: sw1 pos2 closed (input signal high</a:t>
+            </a:r>
+            <a:r>
+              <a:rPr lang="sv-SE" dirty="0" smtClean="0"/>
+              <a:t>)</a:t>
+            </a:r>
+            <a:endParaRPr lang="sv-SE" dirty="0" smtClean="0"/>
           </a:p>
           <a:p>
             <a:r>
@@ -5641,6 +5756,7 @@
               <a:rPr lang="sv-SE" dirty="0" smtClean="0"/>
               <a:t>)</a:t>
             </a:r>
+            <a:endParaRPr lang="sv-SE" dirty="0" smtClean="0"/>
           </a:p>
           <a:p>
             <a:r>
@@ -5663,17 +5779,24 @@
             </a:r>
             <a:r>
               <a:rPr lang="sv-SE" dirty="0"/>
-              <a:t>closed (input signal high)</a:t>
-            </a:r>
-          </a:p>
-          <a:p>
+              <a:t>closed (input signal high</a:t>
+            </a:r>
+            <a:r>
+              <a:rPr lang="sv-SE" dirty="0" smtClean="0"/>
+              <a:t>)</a:t>
+            </a:r>
             <a:endParaRPr lang="sv-SE" dirty="0" smtClean="0"/>
           </a:p>
           <a:p>
             <a:r>
-              <a:rPr lang="sv-SE" smtClean="0"/>
-              <a:t>General interlock:</a:t>
-            </a:r>
+              <a:rPr lang="sv-SE" dirty="0" smtClean="0"/>
+              <a:t>General interlock</a:t>
+            </a:r>
+            <a:r>
+              <a:rPr lang="sv-SE" dirty="0"/>
+              <a:t>: PC power off</a:t>
+            </a:r>
+            <a:endParaRPr lang="sv-SE" dirty="0" smtClean="0"/>
           </a:p>
           <a:p>
             <a:endParaRPr lang="sv-SE" dirty="0"/>

</xml_diff>